<commit_message>
Update and create ppt for documentation
</commit_message>
<xml_diff>
--- a/FHIR_APPOINTMENT/HEALTHCARESERVICE.pptx
+++ b/FHIR_APPOINTMENT/HEALTHCARESERVICE.pptx
@@ -5,7 +5,7 @@
     <p:sldMasterId id="2147483648" r:id="rId1"/>
   </p:sldMasterIdLst>
   <p:notesMasterIdLst>
-    <p:notesMasterId r:id="rId11"/>
+    <p:notesMasterId r:id="rId9"/>
   </p:notesMasterIdLst>
   <p:sldIdLst>
     <p:sldId id="256" r:id="rId2"/>
@@ -15,8 +15,6 @@
     <p:sldId id="260" r:id="rId6"/>
     <p:sldId id="261" r:id="rId7"/>
     <p:sldId id="262" r:id="rId8"/>
-    <p:sldId id="263" r:id="rId9"/>
-    <p:sldId id="264" r:id="rId10"/>
   </p:sldIdLst>
   <p:sldSz cx="12192000" cy="6858000"/>
   <p:notesSz cx="6858000" cy="9144000"/>
@@ -555,188 +553,6 @@
     <p:extLst>
       <p:ext uri="{BB962C8B-B14F-4D97-AF65-F5344CB8AC3E}">
         <p14:creationId xmlns:p14="http://schemas.microsoft.com/office/powerpoint/2010/main" val="2225316982"/>
-      </p:ext>
-    </p:extLst>
-  </p:cSld>
-  <p:clrMapOvr>
-    <a:masterClrMapping/>
-  </p:clrMapOvr>
-</p:notes>
-</file>
-
-<file path=ppt/notesSlides/notesSlide2.xml><?xml version="1.0" encoding="utf-8"?>
-<p:notes xmlns:a="http://schemas.openxmlformats.org/drawingml/2006/main" xmlns:r="http://schemas.openxmlformats.org/officeDocument/2006/relationships" xmlns:p="http://schemas.openxmlformats.org/presentationml/2006/main">
-  <p:cSld>
-    <p:spTree>
-      <p:nvGrpSpPr>
-        <p:cNvPr id="1" name=""/>
-        <p:cNvGrpSpPr/>
-        <p:nvPr/>
-      </p:nvGrpSpPr>
-      <p:grpSpPr>
-        <a:xfrm>
-          <a:off x="0" y="0"/>
-          <a:ext cx="0" cy="0"/>
-          <a:chOff x="0" y="0"/>
-          <a:chExt cx="0" cy="0"/>
-        </a:xfrm>
-      </p:grpSpPr>
-      <p:sp>
-        <p:nvSpPr>
-          <p:cNvPr id="2" name="Slide Image Placeholder 1"/>
-          <p:cNvSpPr>
-            <a:spLocks noGrp="1" noRot="1" noChangeAspect="1"/>
-          </p:cNvSpPr>
-          <p:nvPr>
-            <p:ph type="sldImg"/>
-          </p:nvPr>
-        </p:nvSpPr>
-        <p:spPr/>
-      </p:sp>
-      <p:sp>
-        <p:nvSpPr>
-          <p:cNvPr id="3" name="Notes Placeholder 2"/>
-          <p:cNvSpPr>
-            <a:spLocks noGrp="1"/>
-          </p:cNvSpPr>
-          <p:nvPr>
-            <p:ph type="body" idx="1"/>
-          </p:nvPr>
-        </p:nvSpPr>
-        <p:spPr/>
-        <p:txBody>
-          <a:bodyPr/>
-          <a:lstStyle/>
-          <a:p>
-            <a:r>
-              <a:rPr lang="en-MY" dirty="0" err="1"/>
-              <a:t>url</a:t>
-            </a:r>
-            <a:r>
-              <a:rPr lang="en-MY" dirty="0"/>
-              <a:t> : https://www.hl7.org/fhir/slot.html</a:t>
-            </a:r>
-          </a:p>
-        </p:txBody>
-      </p:sp>
-      <p:sp>
-        <p:nvSpPr>
-          <p:cNvPr id="4" name="Slide Number Placeholder 3"/>
-          <p:cNvSpPr>
-            <a:spLocks noGrp="1"/>
-          </p:cNvSpPr>
-          <p:nvPr>
-            <p:ph type="sldNum" sz="quarter" idx="5"/>
-          </p:nvPr>
-        </p:nvSpPr>
-        <p:spPr/>
-        <p:txBody>
-          <a:bodyPr/>
-          <a:lstStyle/>
-          <a:p>
-            <a:fld id="{4380F5A2-0B31-452C-AFAD-2B02F1F8AECD}" type="slidenum">
-              <a:rPr lang="en-MY" smtClean="0"/>
-              <a:t>8</a:t>
-            </a:fld>
-            <a:endParaRPr lang="en-MY"/>
-          </a:p>
-        </p:txBody>
-      </p:sp>
-    </p:spTree>
-    <p:extLst>
-      <p:ext uri="{BB962C8B-B14F-4D97-AF65-F5344CB8AC3E}">
-        <p14:creationId xmlns:p14="http://schemas.microsoft.com/office/powerpoint/2010/main" val="1360190952"/>
-      </p:ext>
-    </p:extLst>
-  </p:cSld>
-  <p:clrMapOvr>
-    <a:masterClrMapping/>
-  </p:clrMapOvr>
-</p:notes>
-</file>
-
-<file path=ppt/notesSlides/notesSlide3.xml><?xml version="1.0" encoding="utf-8"?>
-<p:notes xmlns:a="http://schemas.openxmlformats.org/drawingml/2006/main" xmlns:r="http://schemas.openxmlformats.org/officeDocument/2006/relationships" xmlns:p="http://schemas.openxmlformats.org/presentationml/2006/main">
-  <p:cSld>
-    <p:spTree>
-      <p:nvGrpSpPr>
-        <p:cNvPr id="1" name=""/>
-        <p:cNvGrpSpPr/>
-        <p:nvPr/>
-      </p:nvGrpSpPr>
-      <p:grpSpPr>
-        <a:xfrm>
-          <a:off x="0" y="0"/>
-          <a:ext cx="0" cy="0"/>
-          <a:chOff x="0" y="0"/>
-          <a:chExt cx="0" cy="0"/>
-        </a:xfrm>
-      </p:grpSpPr>
-      <p:sp>
-        <p:nvSpPr>
-          <p:cNvPr id="2" name="Slide Image Placeholder 1"/>
-          <p:cNvSpPr>
-            <a:spLocks noGrp="1" noRot="1" noChangeAspect="1"/>
-          </p:cNvSpPr>
-          <p:nvPr>
-            <p:ph type="sldImg"/>
-          </p:nvPr>
-        </p:nvSpPr>
-        <p:spPr/>
-      </p:sp>
-      <p:sp>
-        <p:nvSpPr>
-          <p:cNvPr id="3" name="Notes Placeholder 2"/>
-          <p:cNvSpPr>
-            <a:spLocks noGrp="1"/>
-          </p:cNvSpPr>
-          <p:nvPr>
-            <p:ph type="body" idx="1"/>
-          </p:nvPr>
-        </p:nvSpPr>
-        <p:spPr/>
-        <p:txBody>
-          <a:bodyPr/>
-          <a:lstStyle/>
-          <a:p>
-            <a:r>
-              <a:rPr lang="en-MY" dirty="0" err="1"/>
-              <a:t>url</a:t>
-            </a:r>
-            <a:r>
-              <a:rPr lang="en-MY" dirty="0"/>
-              <a:t> : https://www.hl7.org/fhir/slot.html</a:t>
-            </a:r>
-          </a:p>
-        </p:txBody>
-      </p:sp>
-      <p:sp>
-        <p:nvSpPr>
-          <p:cNvPr id="4" name="Slide Number Placeholder 3"/>
-          <p:cNvSpPr>
-            <a:spLocks noGrp="1"/>
-          </p:cNvSpPr>
-          <p:nvPr>
-            <p:ph type="sldNum" sz="quarter" idx="5"/>
-          </p:nvPr>
-        </p:nvSpPr>
-        <p:spPr/>
-        <p:txBody>
-          <a:bodyPr/>
-          <a:lstStyle/>
-          <a:p>
-            <a:fld id="{4380F5A2-0B31-452C-AFAD-2B02F1F8AECD}" type="slidenum">
-              <a:rPr lang="en-MY" smtClean="0"/>
-              <a:t>9</a:t>
-            </a:fld>
-            <a:endParaRPr lang="en-MY"/>
-          </a:p>
-        </p:txBody>
-      </p:sp>
-    </p:spTree>
-    <p:extLst>
-      <p:ext uri="{BB962C8B-B14F-4D97-AF65-F5344CB8AC3E}">
-        <p14:creationId xmlns:p14="http://schemas.microsoft.com/office/powerpoint/2010/main" val="2910480570"/>
       </p:ext>
     </p:extLst>
   </p:cSld>
@@ -3997,7 +3813,7 @@
                 <a16:creationId xmlns:a16="http://schemas.microsoft.com/office/drawing/2014/main" id="{2A8AA5BC-4F7A-4226-8F99-6D824B226A97}"/>
               </a:ext>
               <a:ext uri="{C183D7F6-B498-43B3-948B-1728B52AA6E4}">
-                <adec:decorative xmlns:adec="http://schemas.microsoft.com/office/drawing/2017/decorative" val="1"/>
+                <adec:decorative xmlns:adec="http://schemas.microsoft.com/office/drawing/2017/decorative" xmlns="" val="1"/>
               </a:ext>
             </a:extLst>
           </p:cNvPr>
@@ -4060,7 +3876,7 @@
                 <a16:creationId xmlns:a16="http://schemas.microsoft.com/office/drawing/2014/main" id="{3E5445C6-DD42-4979-86FF-03730E8C6DB0}"/>
               </a:ext>
               <a:ext uri="{C183D7F6-B498-43B3-948B-1728B52AA6E4}">
-                <adec:decorative xmlns:adec="http://schemas.microsoft.com/office/drawing/2017/decorative" val="1"/>
+                <adec:decorative xmlns:adec="http://schemas.microsoft.com/office/drawing/2017/decorative" xmlns="" val="1"/>
               </a:ext>
             </a:extLst>
           </p:cNvPr>
@@ -4209,7 +4025,7 @@
                 <a16:creationId xmlns:a16="http://schemas.microsoft.com/office/drawing/2014/main" id="{45000665-DFC7-417E-8FD7-516A0F15C975}"/>
               </a:ext>
               <a:ext uri="{C183D7F6-B498-43B3-948B-1728B52AA6E4}">
-                <adec:decorative xmlns:adec="http://schemas.microsoft.com/office/drawing/2017/decorative" val="1"/>
+                <adec:decorative xmlns:adec="http://schemas.microsoft.com/office/drawing/2017/decorative" xmlns="" val="1"/>
               </a:ext>
             </a:extLst>
           </p:cNvPr>
@@ -5867,8 +5683,8 @@
           <a:lstStyle/>
           <a:p>
             <a:r>
-              <a:rPr lang="en-MY" sz="4000" b="1" dirty="0" err="1"/>
-              <a:t>appointmentType</a:t>
+              <a:rPr lang="en-MY" sz="4000" b="1" dirty="0" err="1" smtClean="0"/>
+              <a:t>referralMethod</a:t>
             </a:r>
             <a:endParaRPr lang="en-MY" sz="4000" b="1" dirty="0"/>
           </a:p>
@@ -5906,14 +5722,24 @@
               <a:rPr lang="en-MY" sz="1800" dirty="0">
                 <a:hlinkClick r:id="rId2"/>
               </a:rPr>
-              <a:t>https://www.hl7.org/fhir/v2/0276/index.html</a:t>
-            </a:r>
-            <a:endParaRPr lang="en-MY" sz="1800" dirty="0"/>
-          </a:p>
-          <a:p>
+              <a:t>https://</a:t>
+            </a:r>
+            <a:r>
+              <a:rPr lang="en-MY" sz="1800" dirty="0" smtClean="0">
+                <a:hlinkClick r:id="rId2"/>
+              </a:rPr>
+              <a:t>www.hl7.org/fhir/codesystem-service-referral-method.html</a:t>
+            </a:r>
+            <a:endParaRPr lang="en-MY" sz="1800" dirty="0" smtClean="0"/>
+          </a:p>
+          <a:p>
+            <a:r>
+              <a:rPr lang="en-MY" sz="1800" dirty="0" smtClean="0"/>
+              <a:t>Examples</a:t>
+            </a:r>
             <a:r>
               <a:rPr lang="en-MY" sz="1800" dirty="0"/>
-              <a:t>Examples: </a:t>
+              <a:t>: </a:t>
             </a:r>
           </a:p>
           <a:p>
@@ -5983,14 +5809,14 @@
           <p:nvPr>
             <p:extLst>
               <p:ext uri="{D42A27DB-BD31-4B8C-83A1-F6EECF244321}">
-                <p14:modId xmlns:p14="http://schemas.microsoft.com/office/powerpoint/2010/main" val="3107742857"/>
+                <p14:modId xmlns:p14="http://schemas.microsoft.com/office/powerpoint/2010/main" val="2725832447"/>
               </p:ext>
             </p:extLst>
           </p:nvPr>
         </p:nvGraphicFramePr>
         <p:xfrm>
           <a:off x="4276344" y="1642002"/>
-          <a:ext cx="6061974" cy="3842220"/>
+          <a:ext cx="6061974" cy="3573996"/>
         </p:xfrm>
         <a:graphic>
           <a:graphicData uri="http://schemas.openxmlformats.org/drawingml/2006/table">
@@ -6054,9 +5880,10 @@
                     <a:lstStyle/>
                     <a:p>
                       <a:r>
-                        <a:rPr lang="en-MY" sz="2000" dirty="0"/>
-                        <a:t>CHECKUP</a:t>
+                        <a:rPr lang="en-MY" sz="2000" dirty="0" smtClean="0"/>
+                        <a:t>fax</a:t>
                       </a:r>
+                      <a:endParaRPr lang="en-MY" sz="2000" dirty="0"/>
                     </a:p>
                   </a:txBody>
                   <a:tcPr marL="101890" marR="101890" marT="50945" marB="50945"/>
@@ -6067,9 +5894,10 @@
                     <a:lstStyle/>
                     <a:p>
                       <a:r>
-                        <a:rPr lang="en-MY" sz="2000" dirty="0"/>
-                        <a:t>A routine check-up, such as an annual physical</a:t>
+                        <a:rPr lang="en-MY" sz="2000" dirty="0" smtClean="0"/>
+                        <a:t>Fax</a:t>
                       </a:r>
+                      <a:endParaRPr lang="en-MY" sz="2000" dirty="0"/>
                     </a:p>
                   </a:txBody>
                   <a:tcPr marL="101890" marR="101890" marT="50945" marB="50945"/>
@@ -6087,9 +5915,10 @@
                     <a:lstStyle/>
                     <a:p>
                       <a:r>
-                        <a:rPr lang="en-MY" sz="2000" dirty="0"/>
-                        <a:t>EMERGENCY</a:t>
+                        <a:rPr lang="en-MY" sz="2000" dirty="0" smtClean="0"/>
+                        <a:t>phone</a:t>
                       </a:r>
+                      <a:endParaRPr lang="en-MY" sz="2000" dirty="0"/>
                     </a:p>
                   </a:txBody>
                   <a:tcPr marL="101890" marR="101890" marT="50945" marB="50945"/>
@@ -6100,9 +5929,10 @@
                     <a:lstStyle/>
                     <a:p>
                       <a:r>
-                        <a:rPr lang="en-MY" sz="2000" dirty="0"/>
-                        <a:t>Emergency appointment</a:t>
+                        <a:rPr lang="en-MY" sz="2000" dirty="0" smtClean="0"/>
+                        <a:t>Phone</a:t>
                       </a:r>
+                      <a:endParaRPr lang="en-MY" sz="2000" dirty="0"/>
                     </a:p>
                   </a:txBody>
                   <a:tcPr marL="101890" marR="101890" marT="50945" marB="50945"/>
@@ -6120,9 +5950,10 @@
                     <a:lstStyle/>
                     <a:p>
                       <a:r>
-                        <a:rPr lang="en-MY" sz="2000" dirty="0"/>
-                        <a:t>FOLLOWUP</a:t>
+                        <a:rPr lang="en-MY" sz="2000" dirty="0" err="1" smtClean="0"/>
+                        <a:t>elec</a:t>
                       </a:r>
+                      <a:endParaRPr lang="en-MY" sz="2000" dirty="0"/>
                     </a:p>
                   </a:txBody>
                   <a:tcPr marL="101890" marR="101890" marT="50945" marB="50945"/>
@@ -6133,9 +5964,14 @@
                     <a:lstStyle/>
                     <a:p>
                       <a:r>
-                        <a:rPr lang="en-MY" sz="2000" dirty="0"/>
-                        <a:t>A follow up visit from a previous appointment</a:t>
+                        <a:rPr lang="en-MY" sz="2000" dirty="0" smtClean="0"/>
+                        <a:t>Secure</a:t>
                       </a:r>
+                      <a:r>
+                        <a:rPr lang="en-MY" sz="2000" baseline="0" dirty="0" smtClean="0"/>
+                        <a:t> Messaging</a:t>
+                      </a:r>
+                      <a:endParaRPr lang="en-MY" sz="2000" dirty="0"/>
                     </a:p>
                   </a:txBody>
                   <a:tcPr marL="101890" marR="101890" marT="50945" marB="50945"/>
@@ -6153,9 +5989,10 @@
                     <a:lstStyle/>
                     <a:p>
                       <a:r>
-                        <a:rPr lang="en-MY" sz="2000" dirty="0"/>
-                        <a:t>ROUTINE</a:t>
+                        <a:rPr lang="en-MY" sz="2000" dirty="0" err="1" smtClean="0"/>
+                        <a:t>semail</a:t>
                       </a:r>
+                      <a:endParaRPr lang="en-MY" sz="2000" dirty="0"/>
                     </a:p>
                   </a:txBody>
                   <a:tcPr marL="101890" marR="101890" marT="50945" marB="50945"/>
@@ -6166,9 +6003,14 @@
                     <a:lstStyle/>
                     <a:p>
                       <a:r>
-                        <a:rPr lang="en-MY" sz="2000" dirty="0"/>
-                        <a:t>Routine appointment – default if not valued</a:t>
+                        <a:rPr lang="en-MY" sz="2000" dirty="0" smtClean="0"/>
+                        <a:t>Secure</a:t>
                       </a:r>
+                      <a:r>
+                        <a:rPr lang="en-MY" sz="2000" baseline="0" dirty="0" smtClean="0"/>
+                        <a:t> Email</a:t>
+                      </a:r>
+                      <a:endParaRPr lang="en-MY" sz="2000" dirty="0"/>
                     </a:p>
                   </a:txBody>
                   <a:tcPr marL="101890" marR="101890" marT="50945" marB="50945"/>
@@ -6186,9 +6028,10 @@
                     <a:lstStyle/>
                     <a:p>
                       <a:r>
-                        <a:rPr lang="en-MY" sz="2000" dirty="0"/>
-                        <a:t>WALKIN</a:t>
+                        <a:rPr lang="en-MY" sz="2000" dirty="0" smtClean="0"/>
+                        <a:t>mail</a:t>
                       </a:r>
+                      <a:endParaRPr lang="en-MY" sz="2000" dirty="0"/>
                     </a:p>
                   </a:txBody>
                   <a:tcPr marL="101890" marR="101890" marT="50945" marB="50945"/>
@@ -6199,9 +6042,10 @@
                     <a:lstStyle/>
                     <a:p>
                       <a:r>
-                        <a:rPr lang="en-MY" sz="2000" dirty="0"/>
-                        <a:t>A previously unscheduled walk-in visit</a:t>
+                        <a:rPr lang="en-MY" sz="2000" dirty="0" smtClean="0"/>
+                        <a:t>Mail</a:t>
                       </a:r>
+                      <a:endParaRPr lang="en-MY" sz="2000" dirty="0"/>
                     </a:p>
                   </a:txBody>
                   <a:tcPr marL="101890" marR="101890" marT="50945" marB="50945"/>
@@ -6248,13 +6092,7 @@
       </p:grpSpPr>
       <p:sp>
         <p:nvSpPr>
-          <p:cNvPr id="2" name="Title 1">
-            <a:extLst>
-              <a:ext uri="{FF2B5EF4-FFF2-40B4-BE49-F238E27FC236}">
-                <a16:creationId xmlns:a16="http://schemas.microsoft.com/office/drawing/2014/main" id="{41FBD54A-80F9-49BE-889E-94DB7772C368}"/>
-              </a:ext>
-            </a:extLst>
-          </p:cNvPr>
+          <p:cNvPr id="5" name="標題 4"/>
           <p:cNvSpPr>
             <a:spLocks noGrp="1"/>
           </p:cNvSpPr>
@@ -6262,35 +6100,18 @@
             <p:ph type="title"/>
           </p:nvPr>
         </p:nvSpPr>
-        <p:spPr>
-          <a:xfrm>
-            <a:off x="838200" y="640080"/>
-            <a:ext cx="2798064" cy="2304288"/>
-          </a:xfrm>
-        </p:spPr>
-        <p:txBody>
-          <a:bodyPr anchor="b">
-            <a:normAutofit/>
-          </a:bodyPr>
-          <a:lstStyle/>
-          <a:p>
-            <a:r>
-              <a:rPr lang="en-MY" sz="4000" b="1" dirty="0" err="1"/>
-              <a:t>SlotStatus</a:t>
-            </a:r>
-            <a:endParaRPr lang="en-MY" sz="4000" b="1" dirty="0"/>
-          </a:p>
-        </p:txBody>
-      </p:sp>
-      <p:sp>
-        <p:nvSpPr>
-          <p:cNvPr id="3" name="Content Placeholder 2">
-            <a:extLst>
-              <a:ext uri="{FF2B5EF4-FFF2-40B4-BE49-F238E27FC236}">
-                <a16:creationId xmlns:a16="http://schemas.microsoft.com/office/drawing/2014/main" id="{12DC3D25-20DE-4742-B1D3-B7F27000374A}"/>
-              </a:ext>
-            </a:extLst>
-          </p:cNvPr>
+        <p:spPr/>
+        <p:txBody>
+          <a:bodyPr/>
+          <a:lstStyle/>
+          <a:p>
+            <a:endParaRPr lang="zh-TW" altLang="en-US"/>
+          </a:p>
+        </p:txBody>
+      </p:sp>
+      <p:sp>
+        <p:nvSpPr>
+          <p:cNvPr id="7" name="內容版面配置區 6"/>
           <p:cNvSpPr>
             <a:spLocks noGrp="1"/>
           </p:cNvSpPr>
@@ -6298,381 +6119,32 @@
             <p:ph idx="1"/>
           </p:nvPr>
         </p:nvSpPr>
-        <p:spPr>
-          <a:xfrm>
-            <a:off x="838200" y="3136392"/>
-            <a:ext cx="2770632" cy="3081528"/>
-          </a:xfrm>
-        </p:spPr>
-        <p:txBody>
-          <a:bodyPr>
-            <a:normAutofit/>
-          </a:bodyPr>
-          <a:lstStyle/>
-          <a:p>
-            <a:r>
-              <a:rPr lang="en-MY" sz="1800" dirty="0">
-                <a:hlinkClick r:id="rId2"/>
-              </a:rPr>
-              <a:t>https://www.hl7.org/fhir/valueset-slotstatus.html</a:t>
-            </a:r>
-            <a:endParaRPr lang="en-MY" sz="1800" dirty="0"/>
-          </a:p>
-          <a:p>
-            <a:r>
-              <a:rPr lang="en-MY" sz="1800" dirty="0"/>
-              <a:t>Examples: </a:t>
-            </a:r>
-          </a:p>
-          <a:p>
-            <a:pPr lvl="1"/>
-            <a:endParaRPr lang="en-MY" sz="1800" dirty="0"/>
-          </a:p>
-        </p:txBody>
-      </p:sp>
-      <p:sp>
-        <p:nvSpPr>
-          <p:cNvPr id="6" name="Arrow: Right 5">
-            <a:extLst>
-              <a:ext uri="{FF2B5EF4-FFF2-40B4-BE49-F238E27FC236}">
-                <a16:creationId xmlns:a16="http://schemas.microsoft.com/office/drawing/2014/main" id="{5DB8D6DD-CDC8-4598-95A3-F1536218A76B}"/>
-              </a:ext>
-            </a:extLst>
-          </p:cNvPr>
-          <p:cNvSpPr/>
-          <p:nvPr/>
-        </p:nvSpPr>
-        <p:spPr>
-          <a:xfrm>
-            <a:off x="2418534" y="4583701"/>
-            <a:ext cx="729574" cy="632297"/>
-          </a:xfrm>
-          <a:prstGeom prst="rightArrow">
-            <a:avLst/>
-          </a:prstGeom>
-        </p:spPr>
-        <p:style>
-          <a:lnRef idx="2">
-            <a:schemeClr val="accent1">
-              <a:shade val="50000"/>
-            </a:schemeClr>
-          </a:lnRef>
-          <a:fillRef idx="1">
-            <a:schemeClr val="accent1"/>
-          </a:fillRef>
-          <a:effectRef idx="0">
-            <a:schemeClr val="accent1"/>
-          </a:effectRef>
-          <a:fontRef idx="minor">
-            <a:schemeClr val="lt1"/>
-          </a:fontRef>
-        </p:style>
-        <p:txBody>
-          <a:bodyPr rtlCol="0" anchor="ctr"/>
-          <a:lstStyle/>
-          <a:p>
-            <a:pPr algn="ctr"/>
-            <a:endParaRPr lang="en-MY"/>
-          </a:p>
-        </p:txBody>
-      </p:sp>
-      <p:graphicFrame>
-        <p:nvGraphicFramePr>
-          <p:cNvPr id="7" name="Table 4">
-            <a:extLst>
-              <a:ext uri="{FF2B5EF4-FFF2-40B4-BE49-F238E27FC236}">
-                <a16:creationId xmlns:a16="http://schemas.microsoft.com/office/drawing/2014/main" id="{CD5D60D0-A834-4D75-8DDE-046FD3355972}"/>
-              </a:ext>
-            </a:extLst>
-          </p:cNvPr>
-          <p:cNvGraphicFramePr>
-            <a:graphicFrameLocks noGrp="1"/>
-          </p:cNvGraphicFramePr>
-          <p:nvPr>
-            <p:extLst>
-              <p:ext uri="{D42A27DB-BD31-4B8C-83A1-F6EECF244321}">
-                <p14:modId xmlns:p14="http://schemas.microsoft.com/office/powerpoint/2010/main" val="3172564584"/>
-              </p:ext>
-            </p:extLst>
-          </p:nvPr>
-        </p:nvGraphicFramePr>
-        <p:xfrm>
-          <a:off x="4276343" y="1642002"/>
-          <a:ext cx="6192603" cy="3573996"/>
-        </p:xfrm>
-        <a:graphic>
-          <a:graphicData uri="http://schemas.openxmlformats.org/drawingml/2006/table">
-            <a:tbl>
-              <a:tblPr firstRow="1" bandRow="1">
-                <a:tableStyleId>{8EC20E35-A176-4012-BC5E-935CFFF8708E}</a:tableStyleId>
-              </a:tblPr>
-              <a:tblGrid>
-                <a:gridCol w="2367053">
-                  <a:extLst>
-                    <a:ext uri="{9D8B030D-6E8A-4147-A177-3AD203B41FA5}">
-                      <a16:colId xmlns:a16="http://schemas.microsoft.com/office/drawing/2014/main" val="2461227089"/>
-                    </a:ext>
-                  </a:extLst>
-                </a:gridCol>
-                <a:gridCol w="3825550">
-                  <a:extLst>
-                    <a:ext uri="{9D8B030D-6E8A-4147-A177-3AD203B41FA5}">
-                      <a16:colId xmlns:a16="http://schemas.microsoft.com/office/drawing/2014/main" val="3317413212"/>
-                    </a:ext>
-                  </a:extLst>
-                </a:gridCol>
-              </a:tblGrid>
-              <a:tr h="443266">
-                <a:tc>
-                  <a:txBody>
-                    <a:bodyPr/>
-                    <a:lstStyle/>
-                    <a:p>
-                      <a:r>
-                        <a:rPr lang="en-MY" sz="2000"/>
-                        <a:t>Code</a:t>
-                      </a:r>
-                    </a:p>
-                  </a:txBody>
-                  <a:tcPr marL="101890" marR="101890" marT="50945" marB="50945"/>
-                </a:tc>
-                <a:tc>
-                  <a:txBody>
-                    <a:bodyPr/>
-                    <a:lstStyle/>
-                    <a:p>
-                      <a:r>
-                        <a:rPr lang="en-MY" sz="2000"/>
-                        <a:t>Display</a:t>
-                      </a:r>
-                    </a:p>
-                  </a:txBody>
-                  <a:tcPr marL="101890" marR="101890" marT="50945" marB="50945"/>
-                </a:tc>
-                <a:extLst>
-                  <a:ext uri="{0D108BD9-81ED-4DB2-BD59-A6C34878D82A}">
-                    <a16:rowId xmlns:a16="http://schemas.microsoft.com/office/drawing/2014/main" val="585734643"/>
-                  </a:ext>
-                </a:extLst>
-              </a:tr>
-              <a:tr h="443266">
-                <a:tc>
-                  <a:txBody>
-                    <a:bodyPr/>
-                    <a:lstStyle/>
-                    <a:p>
-                      <a:r>
-                        <a:rPr lang="en-MY" sz="2000" dirty="0"/>
-                        <a:t>busy</a:t>
-                      </a:r>
-                    </a:p>
-                  </a:txBody>
-                  <a:tcPr marL="101890" marR="101890" marT="50945" marB="50945"/>
-                </a:tc>
-                <a:tc>
-                  <a:txBody>
-                    <a:bodyPr/>
-                    <a:lstStyle/>
-                    <a:p>
-                      <a:r>
-                        <a:rPr lang="en-MY" sz="2000" dirty="0"/>
-                        <a:t>Busy</a:t>
-                      </a:r>
-                    </a:p>
-                  </a:txBody>
-                  <a:tcPr marL="101890" marR="101890" marT="50945" marB="50945"/>
-                </a:tc>
-                <a:extLst>
-                  <a:ext uri="{0D108BD9-81ED-4DB2-BD59-A6C34878D82A}">
-                    <a16:rowId xmlns:a16="http://schemas.microsoft.com/office/drawing/2014/main" val="1805262529"/>
-                  </a:ext>
-                </a:extLst>
-              </a:tr>
-              <a:tr h="443266">
-                <a:tc>
-                  <a:txBody>
-                    <a:bodyPr/>
-                    <a:lstStyle/>
-                    <a:p>
-                      <a:r>
-                        <a:rPr lang="en-MY" sz="2000" dirty="0"/>
-                        <a:t>free</a:t>
-                      </a:r>
-                    </a:p>
-                  </a:txBody>
-                  <a:tcPr marL="101890" marR="101890" marT="50945" marB="50945"/>
-                </a:tc>
-                <a:tc>
-                  <a:txBody>
-                    <a:bodyPr/>
-                    <a:lstStyle/>
-                    <a:p>
-                      <a:r>
-                        <a:rPr lang="en-MY" sz="2000" dirty="0"/>
-                        <a:t>Free</a:t>
-                      </a:r>
-                    </a:p>
-                  </a:txBody>
-                  <a:tcPr marL="101890" marR="101890" marT="50945" marB="50945"/>
-                </a:tc>
-                <a:extLst>
-                  <a:ext uri="{0D108BD9-81ED-4DB2-BD59-A6C34878D82A}">
-                    <a16:rowId xmlns:a16="http://schemas.microsoft.com/office/drawing/2014/main" val="2835373392"/>
-                  </a:ext>
-                </a:extLst>
-              </a:tr>
-              <a:tr h="748066">
-                <a:tc>
-                  <a:txBody>
-                    <a:bodyPr/>
-                    <a:lstStyle/>
-                    <a:p>
-                      <a:r>
-                        <a:rPr lang="en-MY" sz="2000" dirty="0"/>
-                        <a:t>busy-unavailable</a:t>
-                      </a:r>
-                    </a:p>
-                  </a:txBody>
-                  <a:tcPr marL="101890" marR="101890" marT="50945" marB="50945"/>
-                </a:tc>
-                <a:tc>
-                  <a:txBody>
-                    <a:bodyPr/>
-                    <a:lstStyle/>
-                    <a:p>
-                      <a:r>
-                        <a:rPr lang="en-MY" sz="2000" dirty="0"/>
-                        <a:t>Busy ( Unavailable )</a:t>
-                      </a:r>
-                    </a:p>
-                  </a:txBody>
-                  <a:tcPr marL="101890" marR="101890" marT="50945" marB="50945"/>
-                </a:tc>
-                <a:extLst>
-                  <a:ext uri="{0D108BD9-81ED-4DB2-BD59-A6C34878D82A}">
-                    <a16:rowId xmlns:a16="http://schemas.microsoft.com/office/drawing/2014/main" val="1547600245"/>
-                  </a:ext>
-                </a:extLst>
-              </a:tr>
-              <a:tr h="748066">
-                <a:tc>
-                  <a:txBody>
-                    <a:bodyPr/>
-                    <a:lstStyle/>
-                    <a:p>
-                      <a:r>
-                        <a:rPr lang="en-MY" sz="2000" dirty="0"/>
-                        <a:t>busy-tentative</a:t>
-                      </a:r>
-                    </a:p>
-                  </a:txBody>
-                  <a:tcPr marL="101890" marR="101890" marT="50945" marB="50945"/>
-                </a:tc>
-                <a:tc>
-                  <a:txBody>
-                    <a:bodyPr/>
-                    <a:lstStyle/>
-                    <a:p>
-                      <a:r>
-                        <a:rPr lang="en-MY" sz="2000" dirty="0"/>
-                        <a:t>Busy ( Tentative )</a:t>
-                      </a:r>
-                    </a:p>
-                  </a:txBody>
-                  <a:tcPr marL="101890" marR="101890" marT="50945" marB="50945"/>
-                </a:tc>
-                <a:extLst>
-                  <a:ext uri="{0D108BD9-81ED-4DB2-BD59-A6C34878D82A}">
-                    <a16:rowId xmlns:a16="http://schemas.microsoft.com/office/drawing/2014/main" val="2133252228"/>
-                  </a:ext>
-                </a:extLst>
-              </a:tr>
-              <a:tr h="748066">
-                <a:tc>
-                  <a:txBody>
-                    <a:bodyPr/>
-                    <a:lstStyle/>
-                    <a:p>
-                      <a:r>
-                        <a:rPr lang="en-MY" sz="2000" dirty="0"/>
-                        <a:t>entered-in-error</a:t>
-                      </a:r>
-                    </a:p>
-                  </a:txBody>
-                  <a:tcPr marL="101890" marR="101890" marT="50945" marB="50945"/>
-                </a:tc>
-                <a:tc>
-                  <a:txBody>
-                    <a:bodyPr/>
-                    <a:lstStyle/>
-                    <a:p>
-                      <a:r>
-                        <a:rPr lang="en-MY" sz="2000" dirty="0"/>
-                        <a:t>Entered in error</a:t>
-                      </a:r>
-                    </a:p>
-                  </a:txBody>
-                  <a:tcPr marL="101890" marR="101890" marT="50945" marB="50945"/>
-                </a:tc>
-                <a:extLst>
-                  <a:ext uri="{0D108BD9-81ED-4DB2-BD59-A6C34878D82A}">
-                    <a16:rowId xmlns:a16="http://schemas.microsoft.com/office/drawing/2014/main" val="439114206"/>
-                  </a:ext>
-                </a:extLst>
-              </a:tr>
-            </a:tbl>
-          </a:graphicData>
-        </a:graphic>
-      </p:graphicFrame>
-    </p:spTree>
-    <p:extLst>
-      <p:ext uri="{BB962C8B-B14F-4D97-AF65-F5344CB8AC3E}">
-        <p14:creationId xmlns:p14="http://schemas.microsoft.com/office/powerpoint/2010/main" val="2853061066"/>
-      </p:ext>
-    </p:extLst>
-  </p:cSld>
-  <p:clrMapOvr>
-    <a:masterClrMapping/>
-  </p:clrMapOvr>
-</p:sld>
-</file>
-
-<file path=ppt/slides/slide8.xml><?xml version="1.0" encoding="utf-8"?>
-<p:sld xmlns:a="http://schemas.openxmlformats.org/drawingml/2006/main" xmlns:r="http://schemas.openxmlformats.org/officeDocument/2006/relationships" xmlns:p="http://schemas.openxmlformats.org/presentationml/2006/main">
-  <p:cSld>
-    <p:spTree>
-      <p:nvGrpSpPr>
-        <p:cNvPr id="1" name=""/>
-        <p:cNvGrpSpPr/>
-        <p:nvPr/>
-      </p:nvGrpSpPr>
-      <p:grpSpPr>
-        <a:xfrm>
-          <a:off x="0" y="0"/>
-          <a:ext cx="0" cy="0"/>
-          <a:chOff x="0" y="0"/>
-          <a:chExt cx="0" cy="0"/>
-        </a:xfrm>
-      </p:grpSpPr>
+        <p:spPr/>
+        <p:txBody>
+          <a:bodyPr/>
+          <a:lstStyle/>
+          <a:p>
+            <a:endParaRPr lang="zh-TW" altLang="en-US"/>
+          </a:p>
+        </p:txBody>
+      </p:sp>
       <p:pic>
         <p:nvPicPr>
-          <p:cNvPr id="6" name="內容版面配置區 5"/>
+          <p:cNvPr id="8" name="圖片 7"/>
           <p:cNvPicPr>
-            <a:picLocks noGrp="1" noChangeAspect="1"/>
+            <a:picLocks noChangeAspect="1"/>
           </p:cNvPicPr>
-          <p:nvPr>
-            <p:ph idx="1"/>
-          </p:nvPr>
+          <p:nvPr/>
         </p:nvPicPr>
         <p:blipFill rotWithShape="1">
-          <a:blip r:embed="rId3"/>
-          <a:srcRect l="2476" t="22058" r="3506" b="5525"/>
+          <a:blip r:embed="rId2"/>
+          <a:srcRect l="1249" t="17407" r="3333" b="14629"/>
           <a:stretch/>
         </p:blipFill>
         <p:spPr>
           <a:xfrm>
-            <a:off x="604909" y="773723"/>
-            <a:ext cx="11104309" cy="4811151"/>
+            <a:off x="0" y="1304926"/>
+            <a:ext cx="12160180" cy="4872037"/>
           </a:xfrm>
           <a:prstGeom prst="rect">
             <a:avLst/>
@@ -6682,79 +6154,7 @@
     </p:spTree>
     <p:extLst>
       <p:ext uri="{BB962C8B-B14F-4D97-AF65-F5344CB8AC3E}">
-        <p14:creationId xmlns:p14="http://schemas.microsoft.com/office/powerpoint/2010/main" val="3229935421"/>
-      </p:ext>
-    </p:extLst>
-  </p:cSld>
-  <p:clrMapOvr>
-    <a:masterClrMapping/>
-  </p:clrMapOvr>
-</p:sld>
-</file>
-
-<file path=ppt/slides/slide9.xml><?xml version="1.0" encoding="utf-8"?>
-<p:sld xmlns:a="http://schemas.openxmlformats.org/drawingml/2006/main" xmlns:r="http://schemas.openxmlformats.org/officeDocument/2006/relationships" xmlns:p="http://schemas.openxmlformats.org/presentationml/2006/main">
-  <p:cSld>
-    <p:spTree>
-      <p:nvGrpSpPr>
-        <p:cNvPr id="1" name=""/>
-        <p:cNvGrpSpPr/>
-        <p:nvPr/>
-      </p:nvGrpSpPr>
-      <p:grpSpPr>
-        <a:xfrm>
-          <a:off x="0" y="0"/>
-          <a:ext cx="0" cy="0"/>
-          <a:chOff x="0" y="0"/>
-          <a:chExt cx="0" cy="0"/>
-        </a:xfrm>
-      </p:grpSpPr>
-      <p:sp>
-        <p:nvSpPr>
-          <p:cNvPr id="2" name="內容版面配置區 1"/>
-          <p:cNvSpPr>
-            <a:spLocks noGrp="1"/>
-          </p:cNvSpPr>
-          <p:nvPr>
-            <p:ph idx="1"/>
-          </p:nvPr>
-        </p:nvSpPr>
-        <p:spPr/>
-        <p:txBody>
-          <a:bodyPr/>
-          <a:lstStyle/>
-          <a:p>
-            <a:endParaRPr lang="zh-TW" altLang="en-US" dirty="0"/>
-          </a:p>
-        </p:txBody>
-      </p:sp>
-      <p:pic>
-        <p:nvPicPr>
-          <p:cNvPr id="3" name="圖片 2"/>
-          <p:cNvPicPr>
-            <a:picLocks noChangeAspect="1"/>
-          </p:cNvPicPr>
-          <p:nvPr/>
-        </p:nvPicPr>
-        <p:blipFill rotWithShape="1">
-          <a:blip r:embed="rId3"/>
-          <a:srcRect l="4437" t="18429" r="13048" b="9659"/>
-          <a:stretch/>
-        </p:blipFill>
-        <p:spPr>
-          <a:xfrm>
-            <a:off x="596677" y="903633"/>
-            <a:ext cx="10757123" cy="5273330"/>
-          </a:xfrm>
-          <a:prstGeom prst="rect">
-            <a:avLst/>
-          </a:prstGeom>
-        </p:spPr>
-      </p:pic>
-    </p:spTree>
-    <p:extLst>
-      <p:ext uri="{BB962C8B-B14F-4D97-AF65-F5344CB8AC3E}">
-        <p14:creationId xmlns:p14="http://schemas.microsoft.com/office/powerpoint/2010/main" val="2452052508"/>
+        <p14:creationId xmlns:p14="http://schemas.microsoft.com/office/powerpoint/2010/main" val="3495018291"/>
       </p:ext>
     </p:extLst>
   </p:cSld>

</xml_diff>